<commit_message>
Update userguide for ppp
</commit_message>
<xml_diff>
--- a/docs/diagrams/AddMedicine.pptx
+++ b/docs/diagrams/AddMedicine.pptx
@@ -9,6 +9,7 @@
     <p:sldId id="259" r:id="rId3"/>
     <p:sldId id="260" r:id="rId4"/>
     <p:sldId id="261" r:id="rId5"/>
+    <p:sldId id="262" r:id="rId6"/>
   </p:sldIdLst>
   <p:sldSz cx="12192000" cy="6858000"/>
   <p:notesSz cx="6858000" cy="9144000"/>
@@ -107,6 +108,11 @@
       </a:defRPr>
     </a:lvl9pPr>
   </p:defaultTextStyle>
+  <p:extLst>
+    <p:ext uri="{EFAFB233-063F-42B5-8137-9DF3F51BA10A}">
+      <p15:sldGuideLst xmlns:p15="http://schemas.microsoft.com/office/powerpoint/2012/main"/>
+    </p:ext>
+  </p:extLst>
 </p:presentation>
 </file>
 
@@ -241,7 +247,7 @@
           <a:p>
             <a:fld id="{9834C5C6-108F-431D-A308-6071880E0825}" type="datetimeFigureOut">
               <a:rPr lang="en-SG" smtClean="0"/>
-              <a:t>6/11/2018</a:t>
+              <a:t>11/11/2018</a:t>
             </a:fld>
             <a:endParaRPr lang="en-SG"/>
           </a:p>
@@ -411,7 +417,7 @@
           <a:p>
             <a:fld id="{9834C5C6-108F-431D-A308-6071880E0825}" type="datetimeFigureOut">
               <a:rPr lang="en-SG" smtClean="0"/>
-              <a:t>6/11/2018</a:t>
+              <a:t>11/11/2018</a:t>
             </a:fld>
             <a:endParaRPr lang="en-SG"/>
           </a:p>
@@ -591,7 +597,7 @@
           <a:p>
             <a:fld id="{9834C5C6-108F-431D-A308-6071880E0825}" type="datetimeFigureOut">
               <a:rPr lang="en-SG" smtClean="0"/>
-              <a:t>6/11/2018</a:t>
+              <a:t>11/11/2018</a:t>
             </a:fld>
             <a:endParaRPr lang="en-SG"/>
           </a:p>
@@ -761,7 +767,7 @@
           <a:p>
             <a:fld id="{9834C5C6-108F-431D-A308-6071880E0825}" type="datetimeFigureOut">
               <a:rPr lang="en-SG" smtClean="0"/>
-              <a:t>6/11/2018</a:t>
+              <a:t>11/11/2018</a:t>
             </a:fld>
             <a:endParaRPr lang="en-SG"/>
           </a:p>
@@ -1007,7 +1013,7 @@
           <a:p>
             <a:fld id="{9834C5C6-108F-431D-A308-6071880E0825}" type="datetimeFigureOut">
               <a:rPr lang="en-SG" smtClean="0"/>
-              <a:t>6/11/2018</a:t>
+              <a:t>11/11/2018</a:t>
             </a:fld>
             <a:endParaRPr lang="en-SG"/>
           </a:p>
@@ -1239,7 +1245,7 @@
           <a:p>
             <a:fld id="{9834C5C6-108F-431D-A308-6071880E0825}" type="datetimeFigureOut">
               <a:rPr lang="en-SG" smtClean="0"/>
-              <a:t>6/11/2018</a:t>
+              <a:t>11/11/2018</a:t>
             </a:fld>
             <a:endParaRPr lang="en-SG"/>
           </a:p>
@@ -1606,7 +1612,7 @@
           <a:p>
             <a:fld id="{9834C5C6-108F-431D-A308-6071880E0825}" type="datetimeFigureOut">
               <a:rPr lang="en-SG" smtClean="0"/>
-              <a:t>6/11/2018</a:t>
+              <a:t>11/11/2018</a:t>
             </a:fld>
             <a:endParaRPr lang="en-SG"/>
           </a:p>
@@ -1724,7 +1730,7 @@
           <a:p>
             <a:fld id="{9834C5C6-108F-431D-A308-6071880E0825}" type="datetimeFigureOut">
               <a:rPr lang="en-SG" smtClean="0"/>
-              <a:t>6/11/2018</a:t>
+              <a:t>11/11/2018</a:t>
             </a:fld>
             <a:endParaRPr lang="en-SG"/>
           </a:p>
@@ -1819,7 +1825,7 @@
           <a:p>
             <a:fld id="{9834C5C6-108F-431D-A308-6071880E0825}" type="datetimeFigureOut">
               <a:rPr lang="en-SG" smtClean="0"/>
-              <a:t>6/11/2018</a:t>
+              <a:t>11/11/2018</a:t>
             </a:fld>
             <a:endParaRPr lang="en-SG"/>
           </a:p>
@@ -2096,7 +2102,7 @@
           <a:p>
             <a:fld id="{9834C5C6-108F-431D-A308-6071880E0825}" type="datetimeFigureOut">
               <a:rPr lang="en-SG" smtClean="0"/>
-              <a:t>6/11/2018</a:t>
+              <a:t>11/11/2018</a:t>
             </a:fld>
             <a:endParaRPr lang="en-SG"/>
           </a:p>
@@ -2349,7 +2355,7 @@
           <a:p>
             <a:fld id="{9834C5C6-108F-431D-A308-6071880E0825}" type="datetimeFigureOut">
               <a:rPr lang="en-SG" smtClean="0"/>
-              <a:t>6/11/2018</a:t>
+              <a:t>11/11/2018</a:t>
             </a:fld>
             <a:endParaRPr lang="en-SG"/>
           </a:p>
@@ -2562,7 +2568,7 @@
           <a:p>
             <a:fld id="{9834C5C6-108F-431D-A308-6071880E0825}" type="datetimeFigureOut">
               <a:rPr lang="en-SG" smtClean="0"/>
-              <a:t>6/11/2018</a:t>
+              <a:t>11/11/2018</a:t>
             </a:fld>
             <a:endParaRPr lang="en-SG"/>
           </a:p>
@@ -3592,6 +3598,371 @@
 </p:sld>
 </file>
 
+<file path=ppt/slides/slide5.xml><?xml version="1.0" encoding="utf-8"?>
+<p:sld xmlns:a="http://schemas.openxmlformats.org/drawingml/2006/main" xmlns:r="http://schemas.openxmlformats.org/officeDocument/2006/relationships" xmlns:p="http://schemas.openxmlformats.org/presentationml/2006/main">
+  <p:cSld>
+    <p:spTree>
+      <p:nvGrpSpPr>
+        <p:cNvPr id="1" name=""/>
+        <p:cNvGrpSpPr/>
+        <p:nvPr/>
+      </p:nvGrpSpPr>
+      <p:grpSpPr>
+        <a:xfrm>
+          <a:off x="0" y="0"/>
+          <a:ext cx="0" cy="0"/>
+          <a:chOff x="0" y="0"/>
+          <a:chExt cx="0" cy="0"/>
+        </a:xfrm>
+      </p:grpSpPr>
+      <p:pic>
+        <p:nvPicPr>
+          <p:cNvPr id="4" name="Picture 3"/>
+          <p:cNvPicPr>
+            <a:picLocks noChangeAspect="1"/>
+          </p:cNvPicPr>
+          <p:nvPr/>
+        </p:nvPicPr>
+        <p:blipFill rotWithShape="1">
+          <a:blip r:embed="rId2"/>
+          <a:srcRect t="3232" b="5590"/>
+          <a:stretch/>
+        </p:blipFill>
+        <p:spPr>
+          <a:xfrm>
+            <a:off x="0" y="0"/>
+            <a:ext cx="12192000" cy="6858000"/>
+          </a:xfrm>
+          <a:prstGeom prst="rect">
+            <a:avLst/>
+          </a:prstGeom>
+        </p:spPr>
+      </p:pic>
+      <p:sp>
+        <p:nvSpPr>
+          <p:cNvPr id="5" name="Rounded Rectangle 4"/>
+          <p:cNvSpPr/>
+          <p:nvPr/>
+        </p:nvSpPr>
+        <p:spPr>
+          <a:xfrm>
+            <a:off x="147782" y="1847273"/>
+            <a:ext cx="11933382" cy="480290"/>
+          </a:xfrm>
+          <a:prstGeom prst="roundRect">
+            <a:avLst/>
+          </a:prstGeom>
+          <a:noFill/>
+          <a:ln w="28575">
+            <a:solidFill>
+              <a:srgbClr val="FF0000"/>
+            </a:solidFill>
+          </a:ln>
+        </p:spPr>
+        <p:style>
+          <a:lnRef idx="2">
+            <a:schemeClr val="accent1">
+              <a:shade val="50000"/>
+            </a:schemeClr>
+          </a:lnRef>
+          <a:fillRef idx="1">
+            <a:schemeClr val="accent1"/>
+          </a:fillRef>
+          <a:effectRef idx="0">
+            <a:schemeClr val="accent1"/>
+          </a:effectRef>
+          <a:fontRef idx="minor">
+            <a:schemeClr val="lt1"/>
+          </a:fontRef>
+        </p:style>
+        <p:txBody>
+          <a:bodyPr rtlCol="0" anchor="ctr"/>
+          <a:lstStyle/>
+          <a:p>
+            <a:pPr algn="ctr"/>
+            <a:endParaRPr lang="en-SG"/>
+          </a:p>
+        </p:txBody>
+      </p:sp>
+      <p:sp>
+        <p:nvSpPr>
+          <p:cNvPr id="6" name="Rounded Rectangle 5"/>
+          <p:cNvSpPr/>
+          <p:nvPr/>
+        </p:nvSpPr>
+        <p:spPr>
+          <a:xfrm>
+            <a:off x="138546" y="3428999"/>
+            <a:ext cx="2992582" cy="2999509"/>
+          </a:xfrm>
+          <a:prstGeom prst="roundRect">
+            <a:avLst>
+              <a:gd name="adj" fmla="val 7099"/>
+            </a:avLst>
+          </a:prstGeom>
+          <a:noFill/>
+          <a:ln w="28575">
+            <a:solidFill>
+              <a:srgbClr val="FF0000"/>
+            </a:solidFill>
+          </a:ln>
+        </p:spPr>
+        <p:style>
+          <a:lnRef idx="2">
+            <a:schemeClr val="accent1">
+              <a:shade val="50000"/>
+            </a:schemeClr>
+          </a:lnRef>
+          <a:fillRef idx="1">
+            <a:schemeClr val="accent1"/>
+          </a:fillRef>
+          <a:effectRef idx="0">
+            <a:schemeClr val="accent1"/>
+          </a:effectRef>
+          <a:fontRef idx="minor">
+            <a:schemeClr val="lt1"/>
+          </a:fontRef>
+        </p:style>
+        <p:txBody>
+          <a:bodyPr rtlCol="0" anchor="ctr"/>
+          <a:lstStyle/>
+          <a:p>
+            <a:pPr algn="ctr"/>
+            <a:endParaRPr lang="en-SG"/>
+          </a:p>
+        </p:txBody>
+      </p:sp>
+      <p:sp>
+        <p:nvSpPr>
+          <p:cNvPr id="7" name="TextBox 6"/>
+          <p:cNvSpPr txBox="1"/>
+          <p:nvPr/>
+        </p:nvSpPr>
+        <p:spPr>
+          <a:xfrm>
+            <a:off x="3749964" y="5384799"/>
+            <a:ext cx="2617768" cy="646331"/>
+          </a:xfrm>
+          <a:prstGeom prst="rect">
+            <a:avLst/>
+          </a:prstGeom>
+          <a:noFill/>
+        </p:spPr>
+        <p:txBody>
+          <a:bodyPr wrap="none" rtlCol="0">
+            <a:spAutoFit/>
+          </a:bodyPr>
+          <a:lstStyle/>
+          <a:p>
+            <a:r>
+              <a:rPr lang="fr-FR" dirty="0" smtClean="0">
+                <a:solidFill>
+                  <a:schemeClr val="bg1"/>
+                </a:solidFill>
+              </a:rPr>
+              <a:t>2. Scroll all the </a:t>
+            </a:r>
+            <a:r>
+              <a:rPr lang="fr-FR" dirty="0" err="1" smtClean="0">
+                <a:solidFill>
+                  <a:schemeClr val="bg1"/>
+                </a:solidFill>
+              </a:rPr>
+              <a:t>way</a:t>
+            </a:r>
+            <a:r>
+              <a:rPr lang="fr-FR" dirty="0" smtClean="0">
+                <a:solidFill>
+                  <a:schemeClr val="bg1"/>
+                </a:solidFill>
+              </a:rPr>
+              <a:t> down </a:t>
+            </a:r>
+          </a:p>
+          <a:p>
+            <a:r>
+              <a:rPr lang="fr-FR" dirty="0" smtClean="0">
+                <a:solidFill>
+                  <a:schemeClr val="bg1"/>
+                </a:solidFill>
+              </a:rPr>
+              <a:t>to </a:t>
+            </a:r>
+            <a:r>
+              <a:rPr lang="fr-FR" dirty="0" err="1" smtClean="0">
+                <a:solidFill>
+                  <a:schemeClr val="bg1"/>
+                </a:solidFill>
+              </a:rPr>
+              <a:t>see</a:t>
+            </a:r>
+            <a:r>
+              <a:rPr lang="fr-FR" dirty="0" smtClean="0">
+                <a:solidFill>
+                  <a:schemeClr val="bg1"/>
+                </a:solidFill>
+              </a:rPr>
+              <a:t> the new </a:t>
+            </a:r>
+            <a:r>
+              <a:rPr lang="fr-FR" dirty="0" err="1" smtClean="0">
+                <a:solidFill>
+                  <a:schemeClr val="bg1"/>
+                </a:solidFill>
+              </a:rPr>
+              <a:t>medicine</a:t>
+            </a:r>
+            <a:r>
+              <a:rPr lang="fr-FR" dirty="0">
+                <a:solidFill>
+                  <a:schemeClr val="bg1"/>
+                </a:solidFill>
+              </a:rPr>
+              <a:t>.</a:t>
+            </a:r>
+            <a:endParaRPr lang="en-SG" dirty="0">
+              <a:solidFill>
+                <a:schemeClr val="bg1"/>
+              </a:solidFill>
+            </a:endParaRPr>
+          </a:p>
+        </p:txBody>
+      </p:sp>
+      <p:cxnSp>
+        <p:nvCxnSpPr>
+          <p:cNvPr id="8" name="Straight Arrow Connector 7"/>
+          <p:cNvCxnSpPr/>
+          <p:nvPr/>
+        </p:nvCxnSpPr>
+        <p:spPr>
+          <a:xfrm flipH="1">
+            <a:off x="1016000" y="5578763"/>
+            <a:ext cx="2733964" cy="0"/>
+          </a:xfrm>
+          <a:prstGeom prst="straightConnector1">
+            <a:avLst/>
+          </a:prstGeom>
+          <a:ln w="38100">
+            <a:solidFill>
+              <a:schemeClr val="bg1"/>
+            </a:solidFill>
+            <a:tailEnd type="triangle"/>
+          </a:ln>
+        </p:spPr>
+        <p:style>
+          <a:lnRef idx="1">
+            <a:schemeClr val="accent1"/>
+          </a:lnRef>
+          <a:fillRef idx="0">
+            <a:schemeClr val="accent1"/>
+          </a:fillRef>
+          <a:effectRef idx="0">
+            <a:schemeClr val="accent1"/>
+          </a:effectRef>
+          <a:fontRef idx="minor">
+            <a:schemeClr val="tx1"/>
+          </a:fontRef>
+        </p:style>
+      </p:cxnSp>
+      <p:sp>
+        <p:nvSpPr>
+          <p:cNvPr id="9" name="TextBox 8"/>
+          <p:cNvSpPr txBox="1"/>
+          <p:nvPr/>
+        </p:nvSpPr>
+        <p:spPr>
+          <a:xfrm>
+            <a:off x="3959720" y="1902752"/>
+            <a:ext cx="7410243" cy="369332"/>
+          </a:xfrm>
+          <a:prstGeom prst="rect">
+            <a:avLst/>
+          </a:prstGeom>
+          <a:noFill/>
+        </p:spPr>
+        <p:txBody>
+          <a:bodyPr wrap="square" rtlCol="0">
+            <a:spAutoFit/>
+          </a:bodyPr>
+          <a:lstStyle/>
+          <a:p>
+            <a:r>
+              <a:rPr lang="fr-FR" dirty="0" smtClean="0">
+                <a:solidFill>
+                  <a:schemeClr val="bg1"/>
+                </a:solidFill>
+              </a:rPr>
+              <a:t>1. Type the command in the command box </a:t>
+            </a:r>
+            <a:r>
+              <a:rPr lang="fr-FR" dirty="0" err="1" smtClean="0">
+                <a:solidFill>
+                  <a:schemeClr val="bg1"/>
+                </a:solidFill>
+              </a:rPr>
+              <a:t>with</a:t>
+            </a:r>
+            <a:r>
+              <a:rPr lang="fr-FR" dirty="0" smtClean="0">
+                <a:solidFill>
+                  <a:schemeClr val="bg1"/>
+                </a:solidFill>
+              </a:rPr>
+              <a:t> the </a:t>
+            </a:r>
+            <a:r>
+              <a:rPr lang="fr-FR" dirty="0" err="1" smtClean="0">
+                <a:solidFill>
+                  <a:schemeClr val="bg1"/>
+                </a:solidFill>
+              </a:rPr>
+              <a:t>desired</a:t>
+            </a:r>
+            <a:r>
+              <a:rPr lang="fr-FR" dirty="0" smtClean="0">
+                <a:solidFill>
+                  <a:schemeClr val="bg1"/>
+                </a:solidFill>
+              </a:rPr>
+              <a:t> </a:t>
+            </a:r>
+            <a:r>
+              <a:rPr lang="fr-FR" dirty="0" err="1" smtClean="0">
+                <a:solidFill>
+                  <a:schemeClr val="bg1"/>
+                </a:solidFill>
+              </a:rPr>
+              <a:t>parameters</a:t>
+            </a:r>
+            <a:r>
+              <a:rPr lang="fr-FR" dirty="0" smtClean="0">
+                <a:solidFill>
+                  <a:schemeClr val="bg1"/>
+                </a:solidFill>
+              </a:rPr>
+              <a:t>.</a:t>
+            </a:r>
+            <a:endParaRPr lang="en-SG" dirty="0">
+              <a:solidFill>
+                <a:schemeClr val="bg1"/>
+              </a:solidFill>
+            </a:endParaRPr>
+          </a:p>
+        </p:txBody>
+      </p:sp>
+    </p:spTree>
+    <p:extLst>
+      <p:ext uri="{BB962C8B-B14F-4D97-AF65-F5344CB8AC3E}">
+        <p14:creationId xmlns:p14="http://schemas.microsoft.com/office/powerpoint/2010/main" val="958705649"/>
+      </p:ext>
+    </p:extLst>
+  </p:cSld>
+  <p:clrMapOvr>
+    <a:masterClrMapping/>
+  </p:clrMapOvr>
+</p:sld>
+</file>
+
 <file path=ppt/theme/theme1.xml><?xml version="1.0" encoding="utf-8"?>
 <a:theme xmlns:a="http://schemas.openxmlformats.org/drawingml/2006/main" name="Office Theme">
   <a:themeElements>

</xml_diff>